<commit_message>
Blend flow diagram fix - slide one only
</commit_message>
<xml_diff>
--- a/Blending_SRS/blend-flow.pptx
+++ b/Blending_SRS/blend-flow.pptx
@@ -246,6 +246,22 @@
       </a:defRPr>
     </a:lvl9pPr>
   </p:defaultTextStyle>
+  <p:extLst>
+    <p:ext uri="{EFAFB233-063F-42B5-8137-9DF3F51BA10A}">
+      <p15:sldGuideLst xmlns:p15="http://schemas.microsoft.com/office/powerpoint/2012/main">
+        <p15:guide id="1" orient="horz" pos="1620">
+          <p15:clr>
+            <a:srgbClr val="A4A3A4"/>
+          </p15:clr>
+        </p15:guide>
+        <p15:guide id="2" pos="2880">
+          <p15:clr>
+            <a:srgbClr val="A4A3A4"/>
+          </p15:clr>
+        </p15:guide>
+      </p15:sldGuideLst>
+    </p:ext>
+  </p:extLst>
 </p:presentation>
 </file>
 
@@ -9236,13 +9252,6 @@
   <p:clrMapOvr>
     <a:masterClrMapping/>
   </p:clrMapOvr>
-  <p:timing>
-    <p:tnLst>
-      <p:par>
-        <p:cTn id="1" dur="indefinite" restart="never" nodeType="tmRoot"/>
-      </p:par>
-    </p:tnLst>
-  </p:timing>
 </p:sld>
 </file>
 
@@ -9271,10 +9280,10 @@
         </p:nvGrpSpPr>
         <p:grpSpPr>
           <a:xfrm>
-            <a:off x="179075" y="209550"/>
-            <a:ext cx="8812525" cy="4800600"/>
-            <a:chOff x="-1231800" y="261800"/>
-            <a:chExt cx="10044325" cy="4881750"/>
+            <a:off x="336149" y="42481"/>
+            <a:ext cx="8579251" cy="4650635"/>
+            <a:chOff x="-1328322" y="123450"/>
+            <a:chExt cx="9778444" cy="4729250"/>
           </a:xfrm>
         </p:grpSpPr>
         <p:sp>
@@ -9285,8 +9294,8 @@
           </p:nvSpPr>
           <p:spPr>
             <a:xfrm>
-              <a:off x="-1151425" y="1471325"/>
-              <a:ext cx="1657200" cy="1148700"/>
+              <a:off x="-1317412" y="598715"/>
+              <a:ext cx="1324916" cy="842033"/>
             </a:xfrm>
             <a:prstGeom prst="roundRect">
               <a:avLst>
@@ -9330,7 +9339,7 @@
                 <a:buNone/>
               </a:pPr>
               <a:r>
-                <a:rPr lang="en" sz="1400" b="0" i="0" u="none" strike="noStrike" cap="none">
+                <a:rPr lang="en" sz="1200" b="0" i="0" u="none" strike="noStrike" cap="none" dirty="0">
                   <a:solidFill>
                     <a:srgbClr val="000000"/>
                   </a:solidFill>
@@ -9341,7 +9350,7 @@
                 </a:rPr>
                 <a:t>User enters target parameters</a:t>
               </a:r>
-              <a:endParaRPr sz="1400" b="0" i="0" u="none" strike="noStrike" cap="none">
+              <a:endParaRPr sz="1200" b="0" i="0" u="none" strike="noStrike" cap="none" dirty="0">
                 <a:solidFill>
                   <a:srgbClr val="000000"/>
                 </a:solidFill>
@@ -9361,8 +9370,8 @@
           </p:nvSpPr>
           <p:spPr>
             <a:xfrm>
-              <a:off x="1095250" y="1520975"/>
-              <a:ext cx="1932000" cy="1049400"/>
+              <a:off x="614910" y="662625"/>
+              <a:ext cx="1528049" cy="702751"/>
             </a:xfrm>
             <a:prstGeom prst="roundRect">
               <a:avLst>
@@ -9406,7 +9415,7 @@
                 <a:buNone/>
               </a:pPr>
               <a:r>
-                <a:rPr lang="en" sz="1400" b="0" i="0" u="none" strike="noStrike" cap="none">
+                <a:rPr lang="en" sz="1200" b="0" i="0" u="none" strike="noStrike" cap="none" dirty="0">
                   <a:solidFill>
                     <a:srgbClr val="000000"/>
                   </a:solidFill>
@@ -9417,7 +9426,7 @@
                 </a:rPr>
                 <a:t>User wishes to add sources</a:t>
               </a:r>
-              <a:endParaRPr sz="1400" b="0" i="0" u="none" strike="noStrike" cap="none">
+              <a:endParaRPr sz="1200" b="0" i="0" u="none" strike="noStrike" cap="none" dirty="0">
                 <a:solidFill>
                   <a:srgbClr val="000000"/>
                 </a:solidFill>
@@ -9437,8 +9446,8 @@
           </p:nvSpPr>
           <p:spPr>
             <a:xfrm>
-              <a:off x="3910725" y="1514613"/>
-              <a:ext cx="2114700" cy="1451100"/>
+              <a:off x="326966" y="1644125"/>
+              <a:ext cx="2125093" cy="1433100"/>
             </a:xfrm>
             <a:prstGeom prst="roundRect">
               <a:avLst>
@@ -9482,7 +9491,7 @@
                 <a:buNone/>
               </a:pPr>
               <a:r>
-                <a:rPr lang="en" sz="1400" b="0" i="0" u="none" strike="noStrike" cap="none">
+                <a:rPr lang="en" sz="1200" b="0" i="0" u="none" strike="noStrike" cap="none" dirty="0">
                   <a:solidFill>
                     <a:srgbClr val="000000"/>
                   </a:solidFill>
@@ -9493,7 +9502,7 @@
                 </a:rPr>
                 <a:t>The user can specify the internal vehicle (hyva, dozer or SR) to be used for a stockpile along with the quanity to be used</a:t>
               </a:r>
-              <a:endParaRPr sz="1400" b="0" i="0" u="none" strike="noStrike" cap="none">
+              <a:endParaRPr sz="1200" b="0" i="0" u="none" strike="noStrike" cap="none" dirty="0">
                 <a:solidFill>
                   <a:srgbClr val="000000"/>
                 </a:solidFill>
@@ -9513,8 +9522,8 @@
           </p:nvSpPr>
           <p:spPr>
             <a:xfrm>
-              <a:off x="3910800" y="261800"/>
-              <a:ext cx="2114700" cy="984600"/>
+              <a:off x="2682331" y="643384"/>
+              <a:ext cx="1860247" cy="738411"/>
             </a:xfrm>
             <a:prstGeom prst="roundRect">
               <a:avLst>
@@ -9558,7 +9567,7 @@
                 <a:buNone/>
               </a:pPr>
               <a:r>
-                <a:rPr lang="en" sz="1400" b="0" i="0" u="none" strike="noStrike" cap="none">
+                <a:rPr lang="en" sz="1200" b="0" i="0" u="none" strike="noStrike" cap="none" dirty="0">
                   <a:solidFill>
                     <a:srgbClr val="000000"/>
                   </a:solidFill>
@@ -9569,7 +9578,7 @@
                 </a:rPr>
                 <a:t>User can add a railway rake or truck tippler as a source</a:t>
               </a:r>
-              <a:endParaRPr sz="1400" b="0" i="0" u="none" strike="noStrike" cap="none">
+              <a:endParaRPr sz="1200" b="0" i="0" u="none" strike="noStrike" cap="none" dirty="0">
                 <a:solidFill>
                   <a:srgbClr val="000000"/>
                 </a:solidFill>
@@ -9589,8 +9598,8 @@
           </p:nvSpPr>
           <p:spPr>
             <a:xfrm>
-              <a:off x="323400" y="261800"/>
-              <a:ext cx="1432200" cy="492900"/>
+              <a:off x="-1328322" y="123450"/>
+              <a:ext cx="2496697" cy="492900"/>
             </a:xfrm>
             <a:prstGeom prst="rect">
               <a:avLst/>
@@ -9655,7 +9664,7 @@
           </p:nvSpPr>
           <p:spPr>
             <a:xfrm>
-              <a:off x="6598525" y="1628225"/>
+              <a:off x="2935603" y="1770567"/>
               <a:ext cx="2214000" cy="1164000"/>
             </a:xfrm>
             <a:prstGeom prst="roundRect">
@@ -9700,7 +9709,7 @@
                 <a:buNone/>
               </a:pPr>
               <a:r>
-                <a:rPr lang="en" sz="1400" b="0" i="0" u="none" strike="noStrike" cap="none">
+                <a:rPr lang="en" sz="1200" b="0" i="0" u="none" strike="noStrike" cap="none" dirty="0">
                   <a:solidFill>
                     <a:srgbClr val="000000"/>
                   </a:solidFill>
@@ -9711,7 +9720,7 @@
                 </a:rPr>
                 <a:t>User selects a mode and method.. The input from the previous steps are passed to the blend algorithm. </a:t>
               </a:r>
-              <a:endParaRPr sz="1400" b="0" i="0" u="none" strike="noStrike" cap="none">
+              <a:endParaRPr sz="1200" b="0" i="0" u="none" strike="noStrike" cap="none" dirty="0">
                 <a:solidFill>
                   <a:srgbClr val="000000"/>
                 </a:solidFill>
@@ -9731,8 +9740,8 @@
           </p:nvSpPr>
           <p:spPr>
             <a:xfrm>
-              <a:off x="6467545" y="3206348"/>
-              <a:ext cx="2243130" cy="1635852"/>
+              <a:off x="6467545" y="3307305"/>
+              <a:ext cx="1982577" cy="1348841"/>
             </a:xfrm>
             <a:prstGeom prst="roundRect">
               <a:avLst>
@@ -9776,7 +9785,7 @@
                 <a:buNone/>
               </a:pPr>
               <a:r>
-                <a:rPr lang="en" sz="1400" b="0" i="0" u="none" strike="noStrike" cap="none" dirty="0">
+                <a:rPr lang="en" sz="1200" b="0" i="0" u="none" strike="noStrike" cap="none" dirty="0">
                   <a:solidFill>
                     <a:srgbClr val="FFFFFF"/>
                   </a:solidFill>
@@ -9787,7 +9796,7 @@
                 </a:rPr>
                 <a:t>Blend algorithm process the input and generates a blend plan. This will have two levels: source level and summary </a:t>
               </a:r>
-              <a:endParaRPr sz="1400" b="0" i="0" u="none" strike="noStrike" cap="none" dirty="0">
+              <a:endParaRPr sz="1200" b="0" i="0" u="none" strike="noStrike" cap="none" dirty="0">
                 <a:solidFill>
                   <a:srgbClr val="FFFFFF"/>
                 </a:solidFill>
@@ -9808,7 +9817,7 @@
           <p:spPr>
             <a:xfrm>
               <a:off x="3634325" y="3110750"/>
-              <a:ext cx="2440800" cy="2032800"/>
+              <a:ext cx="2309231" cy="1741950"/>
             </a:xfrm>
             <a:prstGeom prst="roundRect">
               <a:avLst>
@@ -9852,7 +9861,7 @@
                 <a:buNone/>
               </a:pPr>
               <a:r>
-                <a:rPr lang="en" sz="1400" b="0" i="0" u="none" strike="noStrike" cap="none" dirty="0">
+                <a:rPr lang="en" sz="1200" b="0" i="0" u="none" strike="noStrike" cap="none" dirty="0">
                   <a:solidFill>
                     <a:srgbClr val="FFFFFF"/>
                   </a:solidFill>
@@ -9863,7 +9872,7 @@
                 </a:rPr>
                 <a:t>Source level will have the quantity to be picked from a stockpile or railway rake or truck tippler  and the internal vehicle to be used.</a:t>
               </a:r>
-              <a:endParaRPr sz="1400" b="0" i="0" u="none" strike="noStrike" cap="none" dirty="0">
+              <a:endParaRPr sz="1200" b="0" i="0" u="none" strike="noStrike" cap="none" dirty="0">
                 <a:solidFill>
                   <a:srgbClr val="FFFFFF"/>
                 </a:solidFill>
@@ -9892,7 +9901,7 @@
                 <a:buNone/>
               </a:pPr>
               <a:r>
-                <a:rPr lang="en" sz="1400" b="0" i="0" u="none" strike="noStrike" cap="none" dirty="0">
+                <a:rPr lang="en" sz="1200" b="0" i="0" u="none" strike="noStrike" cap="none" dirty="0">
                   <a:solidFill>
                     <a:srgbClr val="FFFFFF"/>
                   </a:solidFill>
@@ -9903,7 +9912,7 @@
                 </a:rPr>
                 <a:t>Summary will contain the output gcv,output cost, etc.</a:t>
               </a:r>
-              <a:endParaRPr sz="1400" b="0" i="0" u="none" strike="noStrike" cap="none" dirty="0">
+              <a:endParaRPr sz="1200" b="0" i="0" u="none" strike="noStrike" cap="none" dirty="0">
                 <a:solidFill>
                   <a:srgbClr val="FFFFFF"/>
                 </a:solidFill>
@@ -9919,160 +9928,92 @@
           <p:nvCxnSpPr>
             <p:cNvPr id="67" name="Google Shape;67;p14"/>
             <p:cNvCxnSpPr>
+              <a:cxnSpLocks/>
               <a:stCxn id="59" idx="3"/>
               <a:endCxn id="60" idx="1"/>
             </p:cNvCxnSpPr>
             <p:nvPr/>
           </p:nvCxnSpPr>
           <p:spPr>
-            <a:xfrm>
-              <a:off x="505775" y="2045675"/>
-              <a:ext cx="589500" cy="0"/>
+            <a:xfrm flipV="1">
+              <a:off x="7504" y="1014001"/>
+              <a:ext cx="607406" cy="5731"/>
             </a:xfrm>
             <a:prstGeom prst="straightConnector1">
               <a:avLst/>
             </a:prstGeom>
-            <a:noFill/>
-            <a:ln w="9525" cap="flat" cmpd="sng">
-              <a:solidFill>
-                <a:schemeClr val="dk2"/>
-              </a:solidFill>
-              <a:prstDash val="solid"/>
-              <a:round/>
+            <a:ln>
               <a:headEnd type="none" w="sm" len="sm"/>
               <a:tailEnd type="triangle" w="med" len="med"/>
             </a:ln>
           </p:spPr>
+          <p:style>
+            <a:lnRef idx="1">
+              <a:schemeClr val="dk1"/>
+            </a:lnRef>
+            <a:fillRef idx="0">
+              <a:schemeClr val="dk1"/>
+            </a:fillRef>
+            <a:effectRef idx="0">
+              <a:schemeClr val="dk1"/>
+            </a:effectRef>
+            <a:fontRef idx="minor">
+              <a:schemeClr val="tx1"/>
+            </a:fontRef>
+          </p:style>
         </p:cxnSp>
         <p:cxnSp>
           <p:nvCxnSpPr>
             <p:cNvPr id="68" name="Google Shape;68;p14"/>
             <p:cNvCxnSpPr>
+              <a:cxnSpLocks/>
               <a:stCxn id="60" idx="3"/>
               <a:endCxn id="62" idx="1"/>
             </p:cNvCxnSpPr>
             <p:nvPr/>
           </p:nvCxnSpPr>
           <p:spPr>
-            <a:xfrm rot="10800000" flipH="1">
-              <a:off x="3027250" y="754175"/>
-              <a:ext cx="883500" cy="1291500"/>
+            <a:xfrm flipV="1">
+              <a:off x="2142959" y="1012589"/>
+              <a:ext cx="539372" cy="1411"/>
             </a:xfrm>
             <a:prstGeom prst="straightConnector1">
               <a:avLst/>
             </a:prstGeom>
-            <a:noFill/>
-            <a:ln w="9525" cap="flat" cmpd="sng">
-              <a:solidFill>
-                <a:schemeClr val="dk2"/>
-              </a:solidFill>
-              <a:prstDash val="solid"/>
-              <a:round/>
+            <a:ln>
               <a:headEnd type="none" w="sm" len="sm"/>
               <a:tailEnd type="triangle" w="med" len="med"/>
             </a:ln>
           </p:spPr>
-        </p:cxnSp>
-        <p:cxnSp>
-          <p:nvCxnSpPr>
-            <p:cNvPr id="69" name="Google Shape;69;p14"/>
-            <p:cNvCxnSpPr>
-              <a:stCxn id="60" idx="3"/>
-              <a:endCxn id="61" idx="1"/>
-            </p:cNvCxnSpPr>
-            <p:nvPr/>
-          </p:nvCxnSpPr>
-          <p:spPr>
-            <a:xfrm>
-              <a:off x="3027250" y="2045675"/>
-              <a:ext cx="883500" cy="194400"/>
-            </a:xfrm>
-            <a:prstGeom prst="straightConnector1">
-              <a:avLst/>
-            </a:prstGeom>
-            <a:noFill/>
-            <a:ln w="9525" cap="flat" cmpd="sng">
-              <a:solidFill>
-                <a:schemeClr val="dk2"/>
-              </a:solidFill>
-              <a:prstDash val="solid"/>
-              <a:round/>
-              <a:headEnd type="none" w="sm" len="sm"/>
-              <a:tailEnd type="triangle" w="med" len="med"/>
-            </a:ln>
-          </p:spPr>
+          <p:style>
+            <a:lnRef idx="1">
+              <a:schemeClr val="dk1"/>
+            </a:lnRef>
+            <a:fillRef idx="0">
+              <a:schemeClr val="dk1"/>
+            </a:fillRef>
+            <a:effectRef idx="0">
+              <a:schemeClr val="dk1"/>
+            </a:effectRef>
+            <a:fontRef idx="minor">
+              <a:schemeClr val="tx1"/>
+            </a:fontRef>
+          </p:style>
         </p:cxnSp>
         <p:cxnSp>
           <p:nvCxnSpPr>
             <p:cNvPr id="70" name="Google Shape;70;p14"/>
             <p:cNvCxnSpPr>
+              <a:cxnSpLocks/>
               <a:stCxn id="61" idx="3"/>
               <a:endCxn id="64" idx="1"/>
             </p:cNvCxnSpPr>
             <p:nvPr/>
           </p:nvCxnSpPr>
           <p:spPr>
-            <a:xfrm rot="10800000" flipH="1">
-              <a:off x="6025425" y="2210163"/>
-              <a:ext cx="573000" cy="30000"/>
-            </a:xfrm>
-            <a:prstGeom prst="straightConnector1">
-              <a:avLst/>
-            </a:prstGeom>
-            <a:noFill/>
-            <a:ln w="9525" cap="flat" cmpd="sng">
-              <a:solidFill>
-                <a:schemeClr val="dk2"/>
-              </a:solidFill>
-              <a:prstDash val="solid"/>
-              <a:round/>
-              <a:headEnd type="none" w="sm" len="sm"/>
-              <a:tailEnd type="triangle" w="med" len="med"/>
-            </a:ln>
-          </p:spPr>
-        </p:cxnSp>
-        <p:cxnSp>
-          <p:nvCxnSpPr>
-            <p:cNvPr id="71" name="Google Shape;71;p14"/>
-            <p:cNvCxnSpPr>
-              <a:stCxn id="62" idx="3"/>
-              <a:endCxn id="64" idx="1"/>
-            </p:cNvCxnSpPr>
-            <p:nvPr/>
-          </p:nvCxnSpPr>
-          <p:spPr>
-            <a:xfrm>
-              <a:off x="6025500" y="754100"/>
-              <a:ext cx="573000" cy="1456200"/>
-            </a:xfrm>
-            <a:prstGeom prst="straightConnector1">
-              <a:avLst/>
-            </a:prstGeom>
-            <a:noFill/>
-            <a:ln w="9525" cap="flat" cmpd="sng">
-              <a:solidFill>
-                <a:schemeClr val="dk2"/>
-              </a:solidFill>
-              <a:prstDash val="solid"/>
-              <a:round/>
-              <a:headEnd type="none" w="sm" len="sm"/>
-              <a:tailEnd type="triangle" w="med" len="med"/>
-            </a:ln>
-          </p:spPr>
-        </p:cxnSp>
-        <p:cxnSp>
-          <p:nvCxnSpPr>
-            <p:cNvPr id="72" name="Google Shape;72;p14"/>
-            <p:cNvCxnSpPr>
-              <a:stCxn id="64" idx="2"/>
-              <a:endCxn id="65" idx="0"/>
-            </p:cNvCxnSpPr>
-            <p:nvPr/>
-          </p:nvCxnSpPr>
-          <p:spPr>
-            <a:xfrm flipH="1">
-              <a:off x="7589111" y="2792226"/>
-              <a:ext cx="116415" cy="414122"/>
+            <a:xfrm flipV="1">
+              <a:off x="2452059" y="2352568"/>
+              <a:ext cx="483544" cy="8107"/>
             </a:xfrm>
             <a:prstGeom prst="straightConnector1">
               <a:avLst/>
@@ -10093,6 +10034,7 @@
           <p:nvCxnSpPr>
             <p:cNvPr id="73" name="Google Shape;73;p14"/>
             <p:cNvCxnSpPr>
+              <a:cxnSpLocks/>
               <a:stCxn id="65" idx="1"/>
               <a:endCxn id="66" idx="3"/>
             </p:cNvCxnSpPr>
@@ -10100,8 +10042,8 @@
           </p:nvCxnSpPr>
           <p:spPr>
             <a:xfrm flipH="1">
-              <a:off x="6075125" y="4024274"/>
-              <a:ext cx="392420" cy="102876"/>
+              <a:off x="5943556" y="3981726"/>
+              <a:ext cx="523989" cy="0"/>
             </a:xfrm>
             <a:prstGeom prst="straightConnector1">
               <a:avLst/>
@@ -10126,8 +10068,8 @@
           </p:nvSpPr>
           <p:spPr>
             <a:xfrm>
-              <a:off x="-1231800" y="3470900"/>
-              <a:ext cx="1555200" cy="1291500"/>
+              <a:off x="-1216918" y="3824804"/>
+              <a:ext cx="1083662" cy="309407"/>
             </a:xfrm>
             <a:prstGeom prst="roundRect">
               <a:avLst>
@@ -10171,7 +10113,7 @@
                 <a:buNone/>
               </a:pPr>
               <a:r>
-                <a:rPr lang="en" sz="1400" b="0" i="0" u="none" strike="noStrike" cap="none">
+                <a:rPr lang="en" sz="1200" b="0" i="0" u="none" strike="noStrike" cap="none" dirty="0">
                   <a:solidFill>
                     <a:srgbClr val="000000"/>
                   </a:solidFill>
@@ -10182,7 +10124,7 @@
                 </a:rPr>
                 <a:t>Next slide</a:t>
               </a:r>
-              <a:endParaRPr sz="1400" b="0" i="0" u="none" strike="noStrike" cap="none">
+              <a:endParaRPr sz="1200" b="0" i="0" u="none" strike="noStrike" cap="none" dirty="0">
                 <a:solidFill>
                   <a:srgbClr val="000000"/>
                 </a:solidFill>
@@ -10202,7 +10144,7 @@
           </p:nvSpPr>
           <p:spPr>
             <a:xfrm>
-              <a:off x="6956475" y="282025"/>
+              <a:off x="6133513" y="527431"/>
               <a:ext cx="1181700" cy="984600"/>
             </a:xfrm>
             <a:prstGeom prst="can">
@@ -10239,46 +10181,18 @@
                 <a:buNone/>
               </a:pPr>
               <a:r>
-                <a:rPr lang="en" dirty="0"/>
+                <a:rPr lang="en" sz="1200" dirty="0"/>
                 <a:t>User input is persisted in the DB</a:t>
               </a:r>
-              <a:endParaRPr dirty="0"/>
+              <a:endParaRPr sz="1200" dirty="0"/>
             </a:p>
           </p:txBody>
         </p:sp>
         <p:cxnSp>
           <p:nvCxnSpPr>
-            <p:cNvPr id="76" name="Google Shape;76;p14"/>
-            <p:cNvCxnSpPr>
-              <a:stCxn id="61" idx="3"/>
-              <a:endCxn id="75" idx="2"/>
-            </p:cNvCxnSpPr>
-            <p:nvPr/>
-          </p:nvCxnSpPr>
-          <p:spPr>
-            <a:xfrm rot="10800000" flipH="1">
-              <a:off x="6025425" y="774363"/>
-              <a:ext cx="930900" cy="1465800"/>
-            </a:xfrm>
-            <a:prstGeom prst="straightConnector1">
-              <a:avLst/>
-            </a:prstGeom>
-            <a:noFill/>
-            <a:ln w="9525" cap="flat" cmpd="sng">
-              <a:solidFill>
-                <a:schemeClr val="dk2"/>
-              </a:solidFill>
-              <a:prstDash val="solid"/>
-              <a:round/>
-              <a:headEnd type="none" w="med" len="med"/>
-              <a:tailEnd type="triangle" w="med" len="med"/>
-            </a:ln>
-          </p:spPr>
-        </p:cxnSp>
-        <p:cxnSp>
-          <p:nvCxnSpPr>
             <p:cNvPr id="77" name="Google Shape;77;p14"/>
             <p:cNvCxnSpPr>
+              <a:cxnSpLocks/>
               <a:stCxn id="62" idx="3"/>
               <a:endCxn id="75" idx="2"/>
             </p:cNvCxnSpPr>
@@ -10286,8 +10200,8 @@
           </p:nvCxnSpPr>
           <p:spPr>
             <a:xfrm>
-              <a:off x="6025500" y="754100"/>
-              <a:ext cx="930900" cy="20100"/>
+              <a:off x="4542578" y="1012589"/>
+              <a:ext cx="1590936" cy="7142"/>
             </a:xfrm>
             <a:prstGeom prst="straightConnector1">
               <a:avLst/>
@@ -10312,8 +10226,8 @@
           </p:nvSpPr>
           <p:spPr>
             <a:xfrm>
-              <a:off x="1168375" y="3401600"/>
-              <a:ext cx="1432200" cy="1451100"/>
+              <a:off x="1175946" y="3331011"/>
+              <a:ext cx="1464256" cy="1296995"/>
             </a:xfrm>
             <a:prstGeom prst="can">
               <a:avLst>
@@ -10349,10 +10263,10 @@
                 <a:buNone/>
               </a:pPr>
               <a:r>
-                <a:rPr lang="en"/>
+                <a:rPr lang="en" sz="1200" dirty="0"/>
                 <a:t>Output from the blend algorithm is persisted in the DB.</a:t>
               </a:r>
-              <a:endParaRPr/>
+              <a:endParaRPr sz="1200" dirty="0"/>
             </a:p>
           </p:txBody>
         </p:sp>
@@ -10360,15 +10274,16 @@
           <p:nvCxnSpPr>
             <p:cNvPr id="79" name="Google Shape;79;p14"/>
             <p:cNvCxnSpPr>
+              <a:cxnSpLocks/>
               <a:stCxn id="66" idx="1"/>
               <a:endCxn id="78" idx="4"/>
             </p:cNvCxnSpPr>
             <p:nvPr/>
           </p:nvCxnSpPr>
           <p:spPr>
-            <a:xfrm rot="10800000">
-              <a:off x="2600525" y="4127150"/>
-              <a:ext cx="1033800" cy="0"/>
+            <a:xfrm flipH="1" flipV="1">
+              <a:off x="2640202" y="3979509"/>
+              <a:ext cx="994123" cy="2217"/>
             </a:xfrm>
             <a:prstGeom prst="straightConnector1">
               <a:avLst/>
@@ -10389,15 +10304,16 @@
           <p:nvCxnSpPr>
             <p:cNvPr id="80" name="Google Shape;80;p14"/>
             <p:cNvCxnSpPr>
+              <a:cxnSpLocks/>
               <a:stCxn id="78" idx="2"/>
               <a:endCxn id="74" idx="3"/>
             </p:cNvCxnSpPr>
             <p:nvPr/>
           </p:nvCxnSpPr>
           <p:spPr>
-            <a:xfrm rot="10800000">
-              <a:off x="323275" y="4116650"/>
-              <a:ext cx="845100" cy="10500"/>
+            <a:xfrm flipH="1" flipV="1">
+              <a:off x="-133255" y="3979508"/>
+              <a:ext cx="1309202" cy="1"/>
             </a:xfrm>
             <a:prstGeom prst="straightConnector1">
               <a:avLst/>
@@ -10414,19 +10330,218 @@
             </a:ln>
           </p:spPr>
         </p:cxnSp>
+        <p:sp>
+          <p:nvSpPr>
+            <p:cNvPr id="57" name="Google Shape;61;p14">
+              <a:extLst>
+                <a:ext uri="{FF2B5EF4-FFF2-40B4-BE49-F238E27FC236}">
+                  <a16:creationId xmlns:a16="http://schemas.microsoft.com/office/drawing/2014/main" id="{8BAA52FD-AE29-4452-850C-D3EF64712E36}"/>
+                </a:ext>
+              </a:extLst>
+            </p:cNvPr>
+            <p:cNvSpPr/>
+            <p:nvPr/>
+          </p:nvSpPr>
+          <p:spPr>
+            <a:xfrm>
+              <a:off x="316387" y="1634822"/>
+              <a:ext cx="2125093" cy="1433100"/>
+            </a:xfrm>
+            <a:prstGeom prst="roundRect">
+              <a:avLst>
+                <a:gd name="adj" fmla="val 16667"/>
+              </a:avLst>
+            </a:prstGeom>
+            <a:solidFill>
+              <a:srgbClr val="6AA84F"/>
+            </a:solidFill>
+            <a:ln w="9525" cap="flat" cmpd="sng">
+              <a:solidFill>
+                <a:schemeClr val="dk2"/>
+              </a:solidFill>
+              <a:prstDash val="solid"/>
+              <a:round/>
+              <a:headEnd type="none" w="sm" len="sm"/>
+              <a:tailEnd type="none" w="sm" len="sm"/>
+            </a:ln>
+          </p:spPr>
+          <p:txBody>
+            <a:bodyPr spcFirstLastPara="1" wrap="square" lIns="91425" tIns="91425" rIns="91425" bIns="91425" anchor="ctr" anchorCtr="0">
+              <a:noAutofit/>
+            </a:bodyPr>
+            <a:lstStyle/>
+            <a:p>
+              <a:pPr marL="0" marR="0" lvl="0" indent="0" algn="l" rtl="0">
+                <a:lnSpc>
+                  <a:spcPct val="100000"/>
+                </a:lnSpc>
+                <a:spcBef>
+                  <a:spcPts val="0"/>
+                </a:spcBef>
+                <a:spcAft>
+                  <a:spcPts val="0"/>
+                </a:spcAft>
+                <a:buClr>
+                  <a:srgbClr val="000000"/>
+                </a:buClr>
+                <a:buSzPts val="1400"/>
+                <a:buFont typeface="Arial"/>
+                <a:buNone/>
+              </a:pPr>
+              <a:r>
+                <a:rPr lang="en" sz="1200" b="0" i="0" u="none" strike="noStrike" cap="none" dirty="0">
+                  <a:solidFill>
+                    <a:srgbClr val="000000"/>
+                  </a:solidFill>
+                  <a:latin typeface="Arial"/>
+                  <a:ea typeface="Arial"/>
+                  <a:cs typeface="Arial"/>
+                  <a:sym typeface="Arial"/>
+                </a:rPr>
+                <a:t>The user can specify the internal vehicle (hyva, dozer or SR) to be used for a stockpile along with the quanity to be used</a:t>
+              </a:r>
+              <a:endParaRPr sz="1200" b="0" i="0" u="none" strike="noStrike" cap="none" dirty="0">
+                <a:solidFill>
+                  <a:srgbClr val="000000"/>
+                </a:solidFill>
+                <a:latin typeface="Arial"/>
+                <a:ea typeface="Arial"/>
+                <a:cs typeface="Arial"/>
+                <a:sym typeface="Arial"/>
+              </a:endParaRPr>
+            </a:p>
+          </p:txBody>
+        </p:sp>
       </p:grpSp>
+      <p:cxnSp>
+        <p:nvCxnSpPr>
+          <p:cNvPr id="30" name="Straight Arrow Connector 29">
+            <a:extLst>
+              <a:ext uri="{FF2B5EF4-FFF2-40B4-BE49-F238E27FC236}">
+                <a16:creationId xmlns:a16="http://schemas.microsoft.com/office/drawing/2014/main" id="{DE3AA4FE-4E0A-4C5F-B533-A0B1DBFC5F1A}"/>
+              </a:ext>
+            </a:extLst>
+          </p:cNvPr>
+          <p:cNvCxnSpPr>
+            <a:stCxn id="60" idx="2"/>
+            <a:endCxn id="61" idx="0"/>
+          </p:cNvCxnSpPr>
+          <p:nvPr/>
+        </p:nvCxnSpPr>
+        <p:spPr>
+          <a:xfrm>
+            <a:off x="2711398" y="1263762"/>
+            <a:ext cx="9281" cy="274115"/>
+          </a:xfrm>
+          <a:prstGeom prst="straightConnector1">
+            <a:avLst/>
+          </a:prstGeom>
+          <a:ln>
+            <a:tailEnd type="triangle"/>
+          </a:ln>
+        </p:spPr>
+        <p:style>
+          <a:lnRef idx="1">
+            <a:schemeClr val="dk1"/>
+          </a:lnRef>
+          <a:fillRef idx="0">
+            <a:schemeClr val="dk1"/>
+          </a:fillRef>
+          <a:effectRef idx="0">
+            <a:schemeClr val="dk1"/>
+          </a:effectRef>
+          <a:fontRef idx="minor">
+            <a:schemeClr val="tx1"/>
+          </a:fontRef>
+        </p:style>
+      </p:cxnSp>
+      <p:cxnSp>
+        <p:nvCxnSpPr>
+          <p:cNvPr id="49" name="Straight Arrow Connector 48">
+            <a:extLst>
+              <a:ext uri="{FF2B5EF4-FFF2-40B4-BE49-F238E27FC236}">
+                <a16:creationId xmlns:a16="http://schemas.microsoft.com/office/drawing/2014/main" id="{06FC8CBD-EB87-482E-81FB-E9F855F23878}"/>
+              </a:ext>
+            </a:extLst>
+          </p:cNvPr>
+          <p:cNvCxnSpPr/>
+          <p:nvPr/>
+        </p:nvCxnSpPr>
+        <p:spPr>
+          <a:xfrm>
+            <a:off x="4343400" y="1279908"/>
+            <a:ext cx="0" cy="382310"/>
+          </a:xfrm>
+          <a:prstGeom prst="straightConnector1">
+            <a:avLst/>
+          </a:prstGeom>
+          <a:ln>
+            <a:tailEnd type="triangle"/>
+          </a:ln>
+        </p:spPr>
+        <p:style>
+          <a:lnRef idx="1">
+            <a:schemeClr val="accent1"/>
+          </a:lnRef>
+          <a:fillRef idx="0">
+            <a:schemeClr val="accent1"/>
+          </a:fillRef>
+          <a:effectRef idx="0">
+            <a:schemeClr val="accent1"/>
+          </a:effectRef>
+          <a:fontRef idx="minor">
+            <a:schemeClr val="tx1"/>
+          </a:fontRef>
+        </p:style>
+      </p:cxnSp>
+      <p:cxnSp>
+        <p:nvCxnSpPr>
+          <p:cNvPr id="51" name="Connector: Elbow 50">
+            <a:extLst>
+              <a:ext uri="{FF2B5EF4-FFF2-40B4-BE49-F238E27FC236}">
+                <a16:creationId xmlns:a16="http://schemas.microsoft.com/office/drawing/2014/main" id="{5BDB773A-FD52-4267-A0CE-B851BB17BE43}"/>
+              </a:ext>
+            </a:extLst>
+          </p:cNvPr>
+          <p:cNvCxnSpPr>
+            <a:cxnSpLocks/>
+            <a:stCxn id="64" idx="3"/>
+            <a:endCxn id="65" idx="0"/>
+          </p:cNvCxnSpPr>
+          <p:nvPr/>
+        </p:nvCxnSpPr>
+        <p:spPr>
+          <a:xfrm>
+            <a:off x="6019645" y="2234544"/>
+            <a:ext cx="2026035" cy="938866"/>
+          </a:xfrm>
+          <a:prstGeom prst="bentConnector2">
+            <a:avLst/>
+          </a:prstGeom>
+          <a:ln>
+            <a:tailEnd type="triangle"/>
+          </a:ln>
+        </p:spPr>
+        <p:style>
+          <a:lnRef idx="1">
+            <a:schemeClr val="dk1"/>
+          </a:lnRef>
+          <a:fillRef idx="0">
+            <a:schemeClr val="dk1"/>
+          </a:fillRef>
+          <a:effectRef idx="0">
+            <a:schemeClr val="dk1"/>
+          </a:effectRef>
+          <a:fontRef idx="minor">
+            <a:schemeClr val="tx1"/>
+          </a:fontRef>
+        </p:style>
+      </p:cxnSp>
     </p:spTree>
   </p:cSld>
   <p:clrMapOvr>
     <a:masterClrMapping/>
   </p:clrMapOvr>
-  <p:timing>
-    <p:tnLst>
-      <p:par>
-        <p:cTn id="1" dur="indefinite" restart="never" nodeType="tmRoot"/>
-      </p:par>
-    </p:tnLst>
-  </p:timing>
 </p:sld>
 </file>
 
@@ -10484,10 +10599,9 @@
             <a:lstStyle/>
             <a:p>
               <a:r>
-                <a:rPr lang="en-US" dirty="0" smtClean="0"/>
+                <a:rPr lang="en-US" dirty="0"/>
                 <a:t>Create Blend Plan</a:t>
               </a:r>
-              <a:endParaRPr lang="en-US" dirty="0"/>
             </a:p>
           </p:txBody>
         </p:sp>
@@ -10499,7 +10613,7 @@
           </p:nvSpPr>
           <p:spPr>
             <a:xfrm>
-              <a:off x="304800" y="895350"/>
+              <a:off x="304800" y="873579"/>
               <a:ext cx="656772" cy="653143"/>
             </a:xfrm>
             <a:prstGeom prst="ellipse">
@@ -10580,18 +10694,13 @@
             <a:p>
               <a:pPr algn="ctr"/>
               <a:r>
-                <a:rPr lang="en-US" dirty="0" smtClean="0">
+                <a:rPr lang="en-US" dirty="0">
                   <a:solidFill>
                     <a:schemeClr val="tx1"/>
                   </a:solidFill>
                 </a:rPr>
                 <a:t>Capture the master parameters</a:t>
               </a:r>
-              <a:endParaRPr lang="en-US" dirty="0">
-                <a:solidFill>
-                  <a:schemeClr val="tx1"/>
-                </a:solidFill>
-              </a:endParaRPr>
             </a:p>
           </p:txBody>
         </p:sp>
@@ -10638,18 +10747,13 @@
             <a:p>
               <a:pPr algn="ctr"/>
               <a:r>
-                <a:rPr lang="en-US" dirty="0" smtClean="0">
+                <a:rPr lang="en-US" dirty="0">
                   <a:solidFill>
                     <a:sysClr val="windowText" lastClr="000000"/>
                   </a:solidFill>
                 </a:rPr>
                 <a:t>DB</a:t>
               </a:r>
-              <a:endParaRPr lang="en-US" dirty="0">
-                <a:solidFill>
-                  <a:sysClr val="windowText" lastClr="000000"/>
-                </a:solidFill>
-              </a:endParaRPr>
             </a:p>
           </p:txBody>
         </p:sp>
@@ -10696,18 +10800,13 @@
             <a:p>
               <a:pPr algn="ctr"/>
               <a:r>
-                <a:rPr lang="en-US" dirty="0" smtClean="0">
+                <a:rPr lang="en-US" dirty="0">
                   <a:solidFill>
                     <a:schemeClr val="tx1"/>
                   </a:solidFill>
                 </a:rPr>
                 <a:t>Display Active Stock Details and Select Required Stock Details</a:t>
               </a:r>
-              <a:endParaRPr lang="en-US" dirty="0">
-                <a:solidFill>
-                  <a:schemeClr val="tx1"/>
-                </a:solidFill>
-              </a:endParaRPr>
             </a:p>
           </p:txBody>
         </p:sp>
@@ -10754,18 +10853,13 @@
             <a:p>
               <a:pPr algn="ctr"/>
               <a:r>
-                <a:rPr lang="en-US" dirty="0" smtClean="0">
+                <a:rPr lang="en-US" dirty="0">
                   <a:solidFill>
                     <a:schemeClr val="tx1"/>
                   </a:solidFill>
                 </a:rPr>
                 <a:t>Get Active Stock List</a:t>
               </a:r>
-              <a:endParaRPr lang="en-US" dirty="0">
-                <a:solidFill>
-                  <a:schemeClr val="tx1"/>
-                </a:solidFill>
-              </a:endParaRPr>
             </a:p>
           </p:txBody>
         </p:sp>
@@ -10773,14 +10867,13 @@
           <p:nvCxnSpPr>
             <p:cNvPr id="21" name="Shape 20"/>
             <p:cNvCxnSpPr>
-              <a:stCxn id="17" idx="2"/>
-              <a:endCxn id="8" idx="1"/>
+              <a:cxnSpLocks/>
             </p:cNvCxnSpPr>
             <p:nvPr/>
           </p:nvCxnSpPr>
           <p:spPr>
             <a:xfrm rot="5400000">
-              <a:off x="-209550" y="2971800"/>
+              <a:off x="-189109" y="2971800"/>
               <a:ext cx="1600200" cy="190500"/>
             </a:xfrm>
             <a:prstGeom prst="bentConnector3">
@@ -10820,7 +10913,7 @@
           <p:spPr>
             <a:xfrm flipV="1">
               <a:off x="961572" y="1200150"/>
-              <a:ext cx="562428" cy="21772"/>
+              <a:ext cx="562428" cy="1"/>
             </a:xfrm>
             <a:prstGeom prst="straightConnector1">
               <a:avLst/>
@@ -10923,18 +11016,13 @@
             <a:p>
               <a:pPr algn="ctr"/>
               <a:r>
-                <a:rPr lang="en-US" dirty="0" smtClean="0">
+                <a:rPr lang="en-US" dirty="0">
                   <a:solidFill>
                     <a:schemeClr val="tx1"/>
                   </a:solidFill>
                 </a:rPr>
                 <a:t>Add Rake/Tippler Quantity (Optional)</a:t>
               </a:r>
-              <a:endParaRPr lang="en-US" dirty="0">
-                <a:solidFill>
-                  <a:schemeClr val="tx1"/>
-                </a:solidFill>
-              </a:endParaRPr>
             </a:p>
           </p:txBody>
         </p:sp>
@@ -11017,7 +11105,7 @@
             <a:p>
               <a:pPr algn="ctr"/>
               <a:r>
-                <a:rPr lang="en-US" dirty="0" smtClean="0">
+                <a:rPr lang="en-US" dirty="0">
                   <a:solidFill>
                     <a:schemeClr val="tx1"/>
                   </a:solidFill>
@@ -11025,7 +11113,7 @@
                 <a:t>Select Reclaim mode – SR/</a:t>
               </a:r>
               <a:r>
-                <a:rPr lang="en-US" dirty="0" err="1" smtClean="0">
+                <a:rPr lang="en-US" dirty="0" err="1">
                   <a:solidFill>
                     <a:schemeClr val="tx1"/>
                   </a:solidFill>
@@ -11033,18 +11121,13 @@
                 <a:t>Hywa</a:t>
               </a:r>
               <a:r>
-                <a:rPr lang="en-US" dirty="0" smtClean="0">
+                <a:rPr lang="en-US" dirty="0">
                   <a:solidFill>
                     <a:schemeClr val="tx1"/>
                   </a:solidFill>
                 </a:rPr>
                 <a:t>/Dozer</a:t>
               </a:r>
-              <a:endParaRPr lang="en-US" dirty="0">
-                <a:solidFill>
-                  <a:schemeClr val="tx1"/>
-                </a:solidFill>
-              </a:endParaRPr>
             </a:p>
           </p:txBody>
         </p:sp>
@@ -11166,18 +11249,13 @@
             <a:p>
               <a:pPr algn="ctr"/>
               <a:r>
-                <a:rPr lang="en-US" dirty="0" smtClean="0">
+                <a:rPr lang="en-US" dirty="0">
                   <a:solidFill>
                     <a:schemeClr val="tx1"/>
                   </a:solidFill>
                 </a:rPr>
                 <a:t>Select Blend mode and Method</a:t>
               </a:r>
-              <a:endParaRPr lang="en-US" dirty="0">
-                <a:solidFill>
-                  <a:schemeClr val="tx1"/>
-                </a:solidFill>
-              </a:endParaRPr>
             </a:p>
           </p:txBody>
         </p:sp>
@@ -11224,18 +11302,13 @@
             <a:p>
               <a:pPr algn="ctr"/>
               <a:r>
-                <a:rPr lang="en-US" dirty="0" smtClean="0">
+                <a:rPr lang="en-US" dirty="0">
                   <a:solidFill>
                     <a:schemeClr val="tx1"/>
                   </a:solidFill>
                 </a:rPr>
                 <a:t>Construct the structure and invoke algorithm</a:t>
               </a:r>
-              <a:endParaRPr lang="en-US" dirty="0">
-                <a:solidFill>
-                  <a:schemeClr val="tx1"/>
-                </a:solidFill>
-              </a:endParaRPr>
             </a:p>
           </p:txBody>
         </p:sp>
@@ -11283,7 +11356,7 @@
           </p:nvSpPr>
           <p:spPr>
             <a:xfrm>
-              <a:off x="3733800" y="2114550"/>
+              <a:off x="3657600" y="2667000"/>
               <a:ext cx="1371600" cy="609600"/>
             </a:xfrm>
             <a:prstGeom prst="roundRect">
@@ -11318,18 +11391,13 @@
             <a:p>
               <a:pPr algn="ctr"/>
               <a:r>
-                <a:rPr lang="en-US" dirty="0" smtClean="0">
+                <a:rPr lang="en-US" dirty="0">
                   <a:solidFill>
                     <a:schemeClr val="bg1"/>
                   </a:solidFill>
                 </a:rPr>
                 <a:t>Blend Algorithm</a:t>
               </a:r>
-              <a:endParaRPr lang="en-US" dirty="0">
-                <a:solidFill>
-                  <a:schemeClr val="bg1"/>
-                </a:solidFill>
-              </a:endParaRPr>
             </a:p>
           </p:txBody>
         </p:sp>
@@ -11344,8 +11412,8 @@
           </p:nvCxnSpPr>
           <p:spPr>
             <a:xfrm flipH="1">
-              <a:off x="5105400" y="2419350"/>
-              <a:ext cx="381000" cy="0"/>
+              <a:off x="5029200" y="2419350"/>
+              <a:ext cx="457200" cy="552450"/>
             </a:xfrm>
             <a:prstGeom prst="straightConnector1">
               <a:avLst/>
@@ -11412,18 +11480,13 @@
             <a:p>
               <a:pPr algn="ctr"/>
               <a:r>
-                <a:rPr lang="en-US" dirty="0" smtClean="0">
+                <a:rPr lang="en-US" dirty="0">
                   <a:solidFill>
                     <a:schemeClr val="tx1"/>
                   </a:solidFill>
                 </a:rPr>
                 <a:t>Capture Response and process</a:t>
               </a:r>
-              <a:endParaRPr lang="en-US" dirty="0">
-                <a:solidFill>
-                  <a:schemeClr val="tx1"/>
-                </a:solidFill>
-              </a:endParaRPr>
             </a:p>
           </p:txBody>
         </p:sp>
@@ -11437,9 +11500,9 @@
             <p:nvPr/>
           </p:nvCxnSpPr>
           <p:spPr>
-            <a:xfrm flipH="1">
-              <a:off x="2971800" y="2419350"/>
-              <a:ext cx="762000" cy="533400"/>
+            <a:xfrm flipH="1" flipV="1">
+              <a:off x="2971800" y="2952750"/>
+              <a:ext cx="685800" cy="19050"/>
             </a:xfrm>
             <a:prstGeom prst="straightConnector1">
               <a:avLst/>
@@ -11506,18 +11569,13 @@
             <a:p>
               <a:pPr algn="ctr"/>
               <a:r>
-                <a:rPr lang="en-US" dirty="0" smtClean="0">
+                <a:rPr lang="en-US" dirty="0">
                   <a:solidFill>
                     <a:schemeClr val="tx1"/>
                   </a:solidFill>
                 </a:rPr>
                 <a:t>Display Plan and options to Persist or modify the plan</a:t>
               </a:r>
-              <a:endParaRPr lang="en-US" dirty="0">
-                <a:solidFill>
-                  <a:schemeClr val="tx1"/>
-                </a:solidFill>
-              </a:endParaRPr>
             </a:p>
           </p:txBody>
         </p:sp>
@@ -11708,18 +11766,13 @@
             <a:p>
               <a:pPr algn="ctr"/>
               <a:r>
-                <a:rPr lang="en-US" dirty="0" smtClean="0">
+                <a:rPr lang="en-US" dirty="0">
                   <a:solidFill>
                     <a:schemeClr val="tx1"/>
                   </a:solidFill>
                 </a:rPr>
                 <a:t>Modify the existing stock parameters and re-calculate</a:t>
               </a:r>
-              <a:endParaRPr lang="en-US" dirty="0">
-                <a:solidFill>
-                  <a:schemeClr val="tx1"/>
-                </a:solidFill>
-              </a:endParaRPr>
             </a:p>
           </p:txBody>
         </p:sp>
@@ -11818,10 +11871,9 @@
             <a:lstStyle/>
             <a:p>
               <a:r>
-                <a:rPr lang="en-US" dirty="0" smtClean="0"/>
+                <a:rPr lang="en-US" dirty="0"/>
                 <a:t>Modify</a:t>
               </a:r>
-              <a:endParaRPr lang="en-US" dirty="0"/>
             </a:p>
           </p:txBody>
         </p:sp>
@@ -11884,10 +11936,9 @@
             <a:lstStyle/>
             <a:p>
               <a:r>
-                <a:rPr lang="en-US" dirty="0" smtClean="0"/>
+                <a:rPr lang="en-US" dirty="0"/>
                 <a:t>Persist</a:t>
               </a:r>
-              <a:endParaRPr lang="en-US" dirty="0"/>
             </a:p>
           </p:txBody>
         </p:sp>
@@ -11981,13 +12032,6 @@
   <p:clrMapOvr>
     <a:masterClrMapping/>
   </p:clrMapOvr>
-  <p:timing>
-    <p:tnLst>
-      <p:par>
-        <p:cTn id="1" dur="indefinite" restart="never" nodeType="tmRoot"/>
-      </p:par>
-    </p:tnLst>
-  </p:timing>
 </p:sld>
 </file>
 
@@ -12650,13 +12694,6 @@
   <p:clrMapOvr>
     <a:masterClrMapping/>
   </p:clrMapOvr>
-  <p:timing>
-    <p:tnLst>
-      <p:par>
-        <p:cTn id="1" dur="indefinite" restart="never" nodeType="tmRoot"/>
-      </p:par>
-    </p:tnLst>
-  </p:timing>
 </p:sld>
 </file>
 
@@ -13224,10 +13261,9 @@
             <a:lstStyle/>
             <a:p>
               <a:r>
-                <a:rPr lang="en-US" dirty="0" smtClean="0"/>
+                <a:rPr lang="en-US" dirty="0"/>
                 <a:t>Reports</a:t>
               </a:r>
-              <a:endParaRPr lang="en-US" dirty="0"/>
             </a:p>
           </p:txBody>
         </p:sp>
@@ -13320,18 +13356,13 @@
             <a:p>
               <a:pPr algn="ctr"/>
               <a:r>
-                <a:rPr lang="en-US" dirty="0" smtClean="0">
+                <a:rPr lang="en-US" dirty="0">
                   <a:solidFill>
                     <a:schemeClr val="tx1"/>
                   </a:solidFill>
                 </a:rPr>
                 <a:t>Select From and To-Dates</a:t>
               </a:r>
-              <a:endParaRPr lang="en-US" dirty="0">
-                <a:solidFill>
-                  <a:schemeClr val="tx1"/>
-                </a:solidFill>
-              </a:endParaRPr>
             </a:p>
           </p:txBody>
         </p:sp>
@@ -13378,18 +13409,13 @@
             <a:p>
               <a:pPr algn="ctr"/>
               <a:r>
-                <a:rPr lang="en-US" dirty="0" smtClean="0">
+                <a:rPr lang="en-US" dirty="0">
                   <a:solidFill>
                     <a:schemeClr val="tx1"/>
                   </a:solidFill>
                 </a:rPr>
                 <a:t>Get the Blend plans created between the dates</a:t>
               </a:r>
-              <a:endParaRPr lang="en-US" dirty="0">
-                <a:solidFill>
-                  <a:schemeClr val="tx1"/>
-                </a:solidFill>
-              </a:endParaRPr>
             </a:p>
           </p:txBody>
         </p:sp>
@@ -13436,18 +13462,13 @@
             <a:p>
               <a:pPr algn="ctr"/>
               <a:r>
-                <a:rPr lang="en-US" dirty="0" smtClean="0">
+                <a:rPr lang="en-US" dirty="0">
                   <a:solidFill>
                     <a:sysClr val="windowText" lastClr="000000"/>
                   </a:solidFill>
                 </a:rPr>
                 <a:t>DB</a:t>
               </a:r>
-              <a:endParaRPr lang="en-US" dirty="0">
-                <a:solidFill>
-                  <a:sysClr val="windowText" lastClr="000000"/>
-                </a:solidFill>
-              </a:endParaRPr>
             </a:p>
           </p:txBody>
         </p:sp>
@@ -13533,18 +13554,13 @@
             <a:p>
               <a:pPr algn="ctr"/>
               <a:r>
-                <a:rPr lang="en-US" dirty="0" smtClean="0">
+                <a:rPr lang="en-US" dirty="0">
                   <a:solidFill>
                     <a:schemeClr val="tx1"/>
                   </a:solidFill>
                 </a:rPr>
                 <a:t>Available Blend plans</a:t>
               </a:r>
-              <a:endParaRPr lang="en-US" dirty="0">
-                <a:solidFill>
-                  <a:schemeClr val="tx1"/>
-                </a:solidFill>
-              </a:endParaRPr>
             </a:p>
           </p:txBody>
         </p:sp>
@@ -13699,18 +13715,13 @@
             <a:p>
               <a:pPr algn="ctr"/>
               <a:r>
-                <a:rPr lang="en-US" dirty="0" smtClean="0">
+                <a:rPr lang="en-US" dirty="0">
                   <a:solidFill>
                     <a:schemeClr val="tx1"/>
                   </a:solidFill>
                 </a:rPr>
                 <a:t>Select and mark for execution</a:t>
               </a:r>
-              <a:endParaRPr lang="en-US" dirty="0">
-                <a:solidFill>
-                  <a:schemeClr val="tx1"/>
-                </a:solidFill>
-              </a:endParaRPr>
             </a:p>
           </p:txBody>
         </p:sp>
@@ -13757,18 +13768,13 @@
             <a:p>
               <a:pPr algn="ctr"/>
               <a:r>
-                <a:rPr lang="en-US" dirty="0" smtClean="0">
+                <a:rPr lang="en-US" dirty="0">
                   <a:solidFill>
                     <a:schemeClr val="tx1"/>
                   </a:solidFill>
                 </a:rPr>
                 <a:t>Capture Execution status and persist</a:t>
               </a:r>
-              <a:endParaRPr lang="en-US" dirty="0">
-                <a:solidFill>
-                  <a:schemeClr val="tx1"/>
-                </a:solidFill>
-              </a:endParaRPr>
             </a:p>
           </p:txBody>
         </p:sp>

</xml_diff>